<commit_message>
Modified HTML Presentation and added more examples
</commit_message>
<xml_diff>
--- a/02.html-basics.pptx
+++ b/02.html-basics.pptx
@@ -17,6 +17,7 @@
     <p:sldId id="265" r:id="rId11"/>
     <p:sldId id="266" r:id="rId12"/>
     <p:sldId id="267" r:id="rId13"/>
+    <p:sldId id="268" r:id="rId14"/>
   </p:sldIdLst>
   <p:sldSz cx="12192000" cy="6858000"/>
   <p:notesSz cx="6858000" cy="9144000"/>
@@ -294,7 +295,7 @@
           <a:p>
             <a:fld id="{6A50DF0E-35A5-4CDB-8B61-7742E578C1F3}" type="datetimeFigureOut">
               <a:rPr lang="en-US" smtClean="0"/>
-              <a:t>11/10/2014</a:t>
+              <a:t>11/12/2014</a:t>
             </a:fld>
             <a:endParaRPr lang="en-US"/>
           </a:p>
@@ -606,7 +607,7 @@
           <a:p>
             <a:fld id="{6A50DF0E-35A5-4CDB-8B61-7742E578C1F3}" type="datetimeFigureOut">
               <a:rPr lang="en-US" smtClean="0"/>
-              <a:t>11/10/2014</a:t>
+              <a:t>11/12/2014</a:t>
             </a:fld>
             <a:endParaRPr lang="en-US"/>
           </a:p>
@@ -828,7 +829,7 @@
           <a:p>
             <a:fld id="{6A50DF0E-35A5-4CDB-8B61-7742E578C1F3}" type="datetimeFigureOut">
               <a:rPr lang="en-US" smtClean="0"/>
-              <a:t>11/10/2014</a:t>
+              <a:t>11/12/2014</a:t>
             </a:fld>
             <a:endParaRPr lang="en-US"/>
           </a:p>
@@ -1119,7 +1120,7 @@
           <a:p>
             <a:fld id="{6A50DF0E-35A5-4CDB-8B61-7742E578C1F3}" type="datetimeFigureOut">
               <a:rPr lang="en-US" smtClean="0"/>
-              <a:t>11/10/2014</a:t>
+              <a:t>11/12/2014</a:t>
             </a:fld>
             <a:endParaRPr lang="en-US"/>
           </a:p>
@@ -1573,7 +1574,7 @@
           <a:p>
             <a:fld id="{6A50DF0E-35A5-4CDB-8B61-7742E578C1F3}" type="datetimeFigureOut">
               <a:rPr lang="en-US" smtClean="0"/>
-              <a:t>11/10/2014</a:t>
+              <a:t>11/12/2014</a:t>
             </a:fld>
             <a:endParaRPr lang="en-US"/>
           </a:p>
@@ -2149,7 +2150,7 @@
           <a:p>
             <a:fld id="{6A50DF0E-35A5-4CDB-8B61-7742E578C1F3}" type="datetimeFigureOut">
               <a:rPr lang="en-US" smtClean="0"/>
-              <a:t>11/10/2014</a:t>
+              <a:t>11/12/2014</a:t>
             </a:fld>
             <a:endParaRPr lang="en-US"/>
           </a:p>
@@ -3001,7 +3002,7 @@
           <a:p>
             <a:fld id="{6A50DF0E-35A5-4CDB-8B61-7742E578C1F3}" type="datetimeFigureOut">
               <a:rPr lang="en-US" smtClean="0"/>
-              <a:t>11/10/2014</a:t>
+              <a:t>11/12/2014</a:t>
             </a:fld>
             <a:endParaRPr lang="en-US"/>
           </a:p>
@@ -3206,7 +3207,7 @@
           <a:p>
             <a:fld id="{6A50DF0E-35A5-4CDB-8B61-7742E578C1F3}" type="datetimeFigureOut">
               <a:rPr lang="en-US" smtClean="0"/>
-              <a:t>11/10/2014</a:t>
+              <a:t>11/12/2014</a:t>
             </a:fld>
             <a:endParaRPr lang="en-US"/>
           </a:p>
@@ -3420,7 +3421,7 @@
           <a:p>
             <a:fld id="{6A50DF0E-35A5-4CDB-8B61-7742E578C1F3}" type="datetimeFigureOut">
               <a:rPr lang="en-US" smtClean="0"/>
-              <a:t>11/10/2014</a:t>
+              <a:t>11/12/2014</a:t>
             </a:fld>
             <a:endParaRPr lang="en-US"/>
           </a:p>
@@ -3625,7 +3626,7 @@
           <a:p>
             <a:fld id="{6A50DF0E-35A5-4CDB-8B61-7742E578C1F3}" type="datetimeFigureOut">
               <a:rPr lang="en-US" smtClean="0"/>
-              <a:t>11/10/2014</a:t>
+              <a:t>11/12/2014</a:t>
             </a:fld>
             <a:endParaRPr lang="en-US"/>
           </a:p>
@@ -3905,7 +3906,7 @@
           <a:p>
             <a:fld id="{6A50DF0E-35A5-4CDB-8B61-7742E578C1F3}" type="datetimeFigureOut">
               <a:rPr lang="en-US" smtClean="0"/>
-              <a:t>11/10/2014</a:t>
+              <a:t>11/12/2014</a:t>
             </a:fld>
             <a:endParaRPr lang="en-US"/>
           </a:p>
@@ -4172,7 +4173,7 @@
           <a:p>
             <a:fld id="{6A50DF0E-35A5-4CDB-8B61-7742E578C1F3}" type="datetimeFigureOut">
               <a:rPr lang="en-US" smtClean="0"/>
-              <a:t>11/10/2014</a:t>
+              <a:t>11/12/2014</a:t>
             </a:fld>
             <a:endParaRPr lang="en-US"/>
           </a:p>
@@ -4587,7 +4588,7 @@
           <a:p>
             <a:fld id="{6A50DF0E-35A5-4CDB-8B61-7742E578C1F3}" type="datetimeFigureOut">
               <a:rPr lang="en-US" smtClean="0"/>
-              <a:t>11/10/2014</a:t>
+              <a:t>11/12/2014</a:t>
             </a:fld>
             <a:endParaRPr lang="en-US"/>
           </a:p>
@@ -4735,7 +4736,7 @@
           <a:p>
             <a:fld id="{6A50DF0E-35A5-4CDB-8B61-7742E578C1F3}" type="datetimeFigureOut">
               <a:rPr lang="en-US" smtClean="0"/>
-              <a:t>11/10/2014</a:t>
+              <a:t>11/12/2014</a:t>
             </a:fld>
             <a:endParaRPr lang="en-US"/>
           </a:p>
@@ -4860,7 +4861,7 @@
           <a:p>
             <a:fld id="{6A50DF0E-35A5-4CDB-8B61-7742E578C1F3}" type="datetimeFigureOut">
               <a:rPr lang="en-US" smtClean="0"/>
-              <a:t>11/10/2014</a:t>
+              <a:t>11/12/2014</a:t>
             </a:fld>
             <a:endParaRPr lang="en-US"/>
           </a:p>
@@ -5139,7 +5140,7 @@
           <a:p>
             <a:fld id="{6A50DF0E-35A5-4CDB-8B61-7742E578C1F3}" type="datetimeFigureOut">
               <a:rPr lang="en-US" smtClean="0"/>
-              <a:t>11/10/2014</a:t>
+              <a:t>11/12/2014</a:t>
             </a:fld>
             <a:endParaRPr lang="en-US"/>
           </a:p>
@@ -5451,7 +5452,7 @@
           <a:p>
             <a:fld id="{6A50DF0E-35A5-4CDB-8B61-7742E578C1F3}" type="datetimeFigureOut">
               <a:rPr lang="en-US" smtClean="0"/>
-              <a:t>11/10/2014</a:t>
+              <a:t>11/12/2014</a:t>
             </a:fld>
             <a:endParaRPr lang="en-US"/>
           </a:p>
@@ -5704,7 +5705,7 @@
           <a:p>
             <a:fld id="{6A50DF0E-35A5-4CDB-8B61-7742E578C1F3}" type="datetimeFigureOut">
               <a:rPr lang="en-US" smtClean="0"/>
-              <a:t>11/10/2014</a:t>
+              <a:t>11/12/2014</a:t>
             </a:fld>
             <a:endParaRPr lang="en-US"/>
           </a:p>
@@ -6257,11 +6258,7 @@
             </a:r>
             <a:r>
               <a:rPr lang="it-IT" noProof="1"/>
-              <a:t>&lt;</a:t>
-            </a:r>
-            <a:r>
-              <a:rPr lang="it-IT" noProof="1"/>
-              <a:t>ol</a:t>
+              <a:t>&lt;ol</a:t>
             </a:r>
             <a:r>
               <a:rPr lang="bg-BG" noProof="1" smtClean="0"/>
@@ -6310,7 +6307,29 @@
             </a:r>
             <a:r>
               <a:rPr lang="en-US" noProof="1" smtClean="0"/>
-              <a:t>, &lt;dt&gt;, &lt;dd&gt;</a:t>
+              <a:t>, &lt;dt&gt;, &lt;dd</a:t>
+            </a:r>
+            <a:r>
+              <a:rPr lang="en-US" noProof="1" smtClean="0"/>
+              <a:t>&gt;</a:t>
+            </a:r>
+          </a:p>
+          <a:p>
+            <a:r>
+              <a:rPr lang="bg-BG" noProof="1" smtClean="0"/>
+              <a:t>Текстово поле </a:t>
+            </a:r>
+            <a:r>
+              <a:rPr lang="en-US" dirty="0"/>
+              <a:t>&lt;</a:t>
+            </a:r>
+            <a:r>
+              <a:rPr lang="en-US" dirty="0" err="1" smtClean="0"/>
+              <a:t>textarea</a:t>
+            </a:r>
+            <a:r>
+              <a:rPr lang="en-US" dirty="0" smtClean="0"/>
+              <a:t>&gt;</a:t>
             </a:r>
             <a:endParaRPr lang="en-US" dirty="0"/>
           </a:p>
@@ -6471,7 +6490,12 @@
             <p:ph type="title"/>
           </p:nvPr>
         </p:nvSpPr>
-        <p:spPr/>
+        <p:spPr>
+          <a:xfrm>
+            <a:off x="913774" y="239577"/>
+            <a:ext cx="10364451" cy="839580"/>
+          </a:xfrm>
+        </p:spPr>
         <p:txBody>
           <a:bodyPr/>
           <a:lstStyle/>
@@ -6488,29 +6512,221 @@
           </a:p>
         </p:txBody>
       </p:sp>
-      <p:sp>
-        <p:nvSpPr>
-          <p:cNvPr id="3" name="Content Placeholder 2"/>
-          <p:cNvSpPr>
-            <a:spLocks noGrp="1"/>
-          </p:cNvSpPr>
-          <p:nvPr>
-            <p:ph sz="quarter" idx="13"/>
-          </p:nvPr>
-        </p:nvSpPr>
-        <p:spPr/>
-        <p:txBody>
-          <a:bodyPr/>
-          <a:lstStyle/>
-          <a:p>
-            <a:endParaRPr lang="en-US" dirty="0"/>
-          </a:p>
-        </p:txBody>
-      </p:sp>
+      <p:pic>
+        <p:nvPicPr>
+          <p:cNvPr id="4" name="Picture 3"/>
+          <p:cNvPicPr>
+            <a:picLocks noChangeAspect="1"/>
+          </p:cNvPicPr>
+          <p:nvPr/>
+        </p:nvPicPr>
+        <p:blipFill>
+          <a:blip r:embed="rId2"/>
+          <a:stretch>
+            <a:fillRect/>
+          </a:stretch>
+        </p:blipFill>
+        <p:spPr>
+          <a:xfrm>
+            <a:off x="1597826" y="1079157"/>
+            <a:ext cx="8996345" cy="5548144"/>
+          </a:xfrm>
+          <a:prstGeom prst="rect">
+            <a:avLst/>
+          </a:prstGeom>
+        </p:spPr>
+      </p:pic>
     </p:spTree>
     <p:extLst>
       <p:ext uri="{BB962C8B-B14F-4D97-AF65-F5344CB8AC3E}">
         <p14:creationId xmlns:p14="http://schemas.microsoft.com/office/powerpoint/2010/main" val="67314733"/>
+      </p:ext>
+    </p:extLst>
+  </p:cSld>
+  <p:clrMapOvr>
+    <a:masterClrMapping/>
+  </p:clrMapOvr>
+</p:sld>
+</file>
+
+<file path=ppt/slides/slide13.xml><?xml version="1.0" encoding="utf-8"?>
+<p:sld xmlns:a="http://schemas.openxmlformats.org/drawingml/2006/main" xmlns:r="http://schemas.openxmlformats.org/officeDocument/2006/relationships" xmlns:p="http://schemas.openxmlformats.org/presentationml/2006/main">
+  <p:cSld>
+    <p:spTree>
+      <p:nvGrpSpPr>
+        <p:cNvPr id="1" name=""/>
+        <p:cNvGrpSpPr/>
+        <p:nvPr/>
+      </p:nvGrpSpPr>
+      <p:grpSpPr>
+        <a:xfrm>
+          <a:off x="0" y="0"/>
+          <a:ext cx="0" cy="0"/>
+          <a:chOff x="0" y="0"/>
+          <a:chExt cx="0" cy="0"/>
+        </a:xfrm>
+      </p:grpSpPr>
+      <p:sp>
+        <p:nvSpPr>
+          <p:cNvPr id="2" name="Title 1"/>
+          <p:cNvSpPr>
+            <a:spLocks noGrp="1"/>
+          </p:cNvSpPr>
+          <p:nvPr>
+            <p:ph type="title"/>
+          </p:nvPr>
+        </p:nvSpPr>
+        <p:spPr/>
+        <p:txBody>
+          <a:bodyPr/>
+          <a:lstStyle/>
+          <a:p>
+            <a:r>
+              <a:rPr lang="en-US" dirty="0" smtClean="0"/>
+              <a:t>HTML </a:t>
+            </a:r>
+            <a:r>
+              <a:rPr lang="bg-BG" dirty="0" smtClean="0"/>
+              <a:t>Задача</a:t>
+            </a:r>
+            <a:endParaRPr lang="en-US" dirty="0"/>
+          </a:p>
+        </p:txBody>
+      </p:sp>
+      <p:sp>
+        <p:nvSpPr>
+          <p:cNvPr id="4" name="Content Placeholder 2"/>
+          <p:cNvSpPr>
+            <a:spLocks noGrp="1"/>
+          </p:cNvSpPr>
+          <p:nvPr>
+            <p:ph sz="quarter" idx="13"/>
+          </p:nvPr>
+        </p:nvSpPr>
+        <p:spPr>
+          <a:xfrm>
+            <a:off x="913774" y="2367092"/>
+            <a:ext cx="10363826" cy="3218162"/>
+          </a:xfrm>
+        </p:spPr>
+        <p:txBody>
+          <a:bodyPr>
+            <a:normAutofit fontScale="70000" lnSpcReduction="20000"/>
+          </a:bodyPr>
+          <a:lstStyle/>
+          <a:p>
+            <a:pPr marL="0" indent="0">
+              <a:buNone/>
+            </a:pPr>
+            <a:r>
+              <a:rPr lang="bg-BG" dirty="0" smtClean="0"/>
+              <a:t>Спазвайки семантичната структура на </a:t>
+            </a:r>
+            <a:r>
+              <a:rPr lang="en-US" dirty="0" smtClean="0"/>
+              <a:t>HTML</a:t>
+            </a:r>
+            <a:r>
+              <a:rPr lang="bg-BG" dirty="0" smtClean="0"/>
+              <a:t>, създайте страница която ви описва.</a:t>
+            </a:r>
+          </a:p>
+          <a:p>
+            <a:pPr marL="0" indent="0">
+              <a:buNone/>
+            </a:pPr>
+            <a:r>
+              <a:rPr lang="bg-BG" dirty="0" smtClean="0"/>
+              <a:t>Страницата трябва да съдържа:</a:t>
+            </a:r>
+          </a:p>
+          <a:p>
+            <a:pPr marL="457200" indent="-457200">
+              <a:buAutoNum type="arabicParenR"/>
+            </a:pPr>
+            <a:r>
+              <a:rPr lang="bg-BG" dirty="0" smtClean="0"/>
+              <a:t>Заглави съдържащо името ви</a:t>
+            </a:r>
+          </a:p>
+          <a:p>
+            <a:pPr marL="457200" indent="-457200">
+              <a:buAutoNum type="arabicParenR"/>
+            </a:pPr>
+            <a:r>
+              <a:rPr lang="bg-BG" dirty="0" smtClean="0"/>
+              <a:t>Ваша снимка по избор</a:t>
+            </a:r>
+          </a:p>
+          <a:p>
+            <a:pPr marL="457200" indent="-457200">
+              <a:buAutoNum type="arabicParenR"/>
+            </a:pPr>
+            <a:r>
+              <a:rPr lang="bg-BG" dirty="0" smtClean="0"/>
+              <a:t>Кратко описание или история за вас, историята трябва да има подзаглавие</a:t>
+            </a:r>
+          </a:p>
+          <a:p>
+            <a:pPr marL="457200" indent="-457200">
+              <a:buAutoNum type="arabicParenR"/>
+            </a:pPr>
+            <a:r>
+              <a:rPr lang="bg-BG" dirty="0" smtClean="0"/>
+              <a:t>Подреден списък с нещата, които обичате да правите в свободното си време</a:t>
+            </a:r>
+          </a:p>
+          <a:p>
+            <a:pPr marL="457200" indent="-457200">
+              <a:buAutoNum type="arabicParenR"/>
+            </a:pPr>
+            <a:r>
+              <a:rPr lang="bg-BG" dirty="0" smtClean="0"/>
+              <a:t>Линк към любима ваша страница</a:t>
+            </a:r>
+          </a:p>
+          <a:p>
+            <a:pPr marL="457200" indent="-457200">
+              <a:buAutoNum type="arabicParenR"/>
+            </a:pPr>
+            <a:r>
+              <a:rPr lang="bg-BG" dirty="0" smtClean="0"/>
+              <a:t>Неподреден списък с любимите ви ястия</a:t>
+            </a:r>
+          </a:p>
+          <a:p>
+            <a:pPr marL="457200" indent="-457200">
+              <a:buAutoNum type="arabicParenR"/>
+            </a:pPr>
+            <a:r>
+              <a:rPr lang="bg-BG" dirty="0" smtClean="0"/>
+              <a:t>Място за попълване на коментари</a:t>
+            </a:r>
+          </a:p>
+          <a:p>
+            <a:pPr marL="457200" indent="-457200">
+              <a:buAutoNum type="arabicParenR"/>
+            </a:pPr>
+            <a:endParaRPr lang="bg-BG" dirty="0" smtClean="0"/>
+          </a:p>
+          <a:p>
+            <a:pPr marL="457200" indent="-457200">
+              <a:buAutoNum type="arabicParenR"/>
+            </a:pPr>
+            <a:endParaRPr lang="bg-BG" dirty="0" smtClean="0"/>
+          </a:p>
+          <a:p>
+            <a:pPr marL="457200" indent="-457200">
+              <a:buAutoNum type="arabicParenR"/>
+            </a:pPr>
+            <a:endParaRPr lang="en-US" dirty="0"/>
+          </a:p>
+        </p:txBody>
+      </p:sp>
+    </p:spTree>
+    <p:extLst>
+      <p:ext uri="{BB962C8B-B14F-4D97-AF65-F5344CB8AC3E}">
+        <p14:creationId xmlns:p14="http://schemas.microsoft.com/office/powerpoint/2010/main" val="1216366924"/>
       </p:ext>
     </p:extLst>
   </p:cSld>
@@ -7398,11 +7614,7 @@
             </a:r>
             <a:r>
               <a:rPr lang="en-US" dirty="0" smtClean="0"/>
-              <a:t>&lt;B&gt;, &lt;I&gt;, &lt;U&gt;, &lt;SUP&gt;, &lt;SUB&gt;, &lt;STRONG&gt;, &lt;EM&gt;, &lt;PRE</a:t>
-            </a:r>
-            <a:r>
-              <a:rPr lang="en-US" dirty="0" smtClean="0"/>
-              <a:t>&gt;</a:t>
+              <a:t>&lt;B&gt;, &lt;I&gt;, &lt;U&gt;, &lt;SUP&gt;, &lt;SUB&gt;, &lt;STRONG&gt;, &lt;EM&gt;, &lt;PRE&gt;</a:t>
             </a:r>
           </a:p>
           <a:p>
@@ -7525,7 +7737,6 @@
               <a:rPr lang="en-US" dirty="0" smtClean="0"/>
               <a:t>, &lt;span&gt;</a:t>
             </a:r>
-            <a:endParaRPr lang="en-US" dirty="0" smtClean="0"/>
           </a:p>
           <a:p>
             <a:endParaRPr lang="en-US" dirty="0"/>

</xml_diff>

<commit_message>
Added HTML 5 Slides
</commit_message>
<xml_diff>
--- a/02.html-basics.pptx
+++ b/02.html-basics.pptx
@@ -18,6 +18,7 @@
     <p:sldId id="266" r:id="rId12"/>
     <p:sldId id="267" r:id="rId13"/>
     <p:sldId id="268" r:id="rId14"/>
+    <p:sldId id="269" r:id="rId15"/>
   </p:sldIdLst>
   <p:sldSz cx="12192000" cy="6858000"/>
   <p:notesSz cx="6858000" cy="9144000"/>
@@ -6307,11 +6308,7 @@
             </a:r>
             <a:r>
               <a:rPr lang="en-US" noProof="1" smtClean="0"/>
-              <a:t>, &lt;dt&gt;, &lt;dd</a:t>
-            </a:r>
-            <a:r>
-              <a:rPr lang="en-US" noProof="1" smtClean="0"/>
-              <a:t>&gt;</a:t>
+              <a:t>, &lt;dt&gt;, &lt;dd&gt;</a:t>
             </a:r>
           </a:p>
           <a:p>
@@ -6727,6 +6724,126 @@
     <p:extLst>
       <p:ext uri="{BB962C8B-B14F-4D97-AF65-F5344CB8AC3E}">
         <p14:creationId xmlns:p14="http://schemas.microsoft.com/office/powerpoint/2010/main" val="1216366924"/>
+      </p:ext>
+    </p:extLst>
+  </p:cSld>
+  <p:clrMapOvr>
+    <a:masterClrMapping/>
+  </p:clrMapOvr>
+</p:sld>
+</file>
+
+<file path=ppt/slides/slide14.xml><?xml version="1.0" encoding="utf-8"?>
+<p:sld xmlns:a="http://schemas.openxmlformats.org/drawingml/2006/main" xmlns:r="http://schemas.openxmlformats.org/officeDocument/2006/relationships" xmlns:p="http://schemas.openxmlformats.org/presentationml/2006/main">
+  <p:cSld>
+    <p:spTree>
+      <p:nvGrpSpPr>
+        <p:cNvPr id="1" name=""/>
+        <p:cNvGrpSpPr/>
+        <p:nvPr/>
+      </p:nvGrpSpPr>
+      <p:grpSpPr>
+        <a:xfrm>
+          <a:off x="0" y="0"/>
+          <a:ext cx="0" cy="0"/>
+          <a:chOff x="0" y="0"/>
+          <a:chExt cx="0" cy="0"/>
+        </a:xfrm>
+      </p:grpSpPr>
+      <p:sp>
+        <p:nvSpPr>
+          <p:cNvPr id="2" name="Title 1"/>
+          <p:cNvSpPr>
+            <a:spLocks noGrp="1"/>
+          </p:cNvSpPr>
+          <p:nvPr>
+            <p:ph type="title"/>
+          </p:nvPr>
+        </p:nvSpPr>
+        <p:spPr/>
+        <p:txBody>
+          <a:bodyPr/>
+          <a:lstStyle/>
+          <a:p>
+            <a:r>
+              <a:rPr lang="en-US" dirty="0" smtClean="0"/>
+              <a:t>HTML 5 </a:t>
+            </a:r>
+            <a:r>
+              <a:rPr lang="bg-BG" dirty="0" smtClean="0"/>
+              <a:t>крачка напред</a:t>
+            </a:r>
+            <a:endParaRPr lang="en-US" dirty="0"/>
+          </a:p>
+        </p:txBody>
+      </p:sp>
+      <p:sp>
+        <p:nvSpPr>
+          <p:cNvPr id="3" name="Content Placeholder 2"/>
+          <p:cNvSpPr>
+            <a:spLocks noGrp="1"/>
+          </p:cNvSpPr>
+          <p:nvPr>
+            <p:ph sz="quarter" idx="13"/>
+          </p:nvPr>
+        </p:nvSpPr>
+        <p:spPr/>
+        <p:txBody>
+          <a:bodyPr/>
+          <a:lstStyle/>
+          <a:p>
+            <a:r>
+              <a:rPr lang="en-US" dirty="0" err="1" smtClean="0"/>
+              <a:t>hTML</a:t>
+            </a:r>
+            <a:r>
+              <a:rPr lang="en-US" dirty="0" smtClean="0"/>
+              <a:t> 5 </a:t>
+            </a:r>
+            <a:r>
+              <a:rPr lang="bg-BG" dirty="0" smtClean="0"/>
+              <a:t>разполага с тагове, които определят разположението на частите от сайта</a:t>
+            </a:r>
+          </a:p>
+          <a:p>
+            <a:r>
+              <a:rPr lang="en-US" dirty="0" smtClean="0"/>
+              <a:t>&lt;Header&gt;</a:t>
+            </a:r>
+          </a:p>
+          <a:p>
+            <a:r>
+              <a:rPr lang="en-US" dirty="0" smtClean="0"/>
+              <a:t>&lt;</a:t>
+            </a:r>
+            <a:r>
+              <a:rPr lang="en-US" dirty="0" err="1" smtClean="0"/>
+              <a:t>Nav</a:t>
+            </a:r>
+            <a:r>
+              <a:rPr lang="en-US" dirty="0" smtClean="0"/>
+              <a:t>&gt;</a:t>
+            </a:r>
+          </a:p>
+          <a:p>
+            <a:r>
+              <a:rPr lang="en-US" dirty="0" smtClean="0"/>
+              <a:t>&lt;Section&gt;</a:t>
+            </a:r>
+          </a:p>
+          <a:p>
+            <a:r>
+              <a:rPr lang="en-US" dirty="0" smtClean="0"/>
+              <a:t>&lt;footer&gt;</a:t>
+            </a:r>
+            <a:endParaRPr lang="en-US" dirty="0"/>
+          </a:p>
+        </p:txBody>
+      </p:sp>
+    </p:spTree>
+    <p:extLst>
+      <p:ext uri="{BB962C8B-B14F-4D97-AF65-F5344CB8AC3E}">
+        <p14:creationId xmlns:p14="http://schemas.microsoft.com/office/powerpoint/2010/main" val="282580509"/>
       </p:ext>
     </p:extLst>
   </p:cSld>

</xml_diff>

<commit_message>
Finalized HTML Basics Presentation and Examples
</commit_message>
<xml_diff>
--- a/02.html-basics.pptx
+++ b/02.html-basics.pptx
@@ -19,6 +19,8 @@
     <p:sldId id="267" r:id="rId13"/>
     <p:sldId id="268" r:id="rId14"/>
     <p:sldId id="269" r:id="rId15"/>
+    <p:sldId id="270" r:id="rId16"/>
+    <p:sldId id="271" r:id="rId17"/>
   </p:sldIdLst>
   <p:sldSz cx="12192000" cy="6858000"/>
   <p:notesSz cx="6858000" cy="9144000"/>
@@ -6789,7 +6791,9 @@
         </p:nvSpPr>
         <p:spPr/>
         <p:txBody>
-          <a:bodyPr/>
+          <a:bodyPr>
+            <a:normAutofit fontScale="77500" lnSpcReduction="20000"/>
+          </a:bodyPr>
           <a:lstStyle/>
           <a:p>
             <a:r>
@@ -6828,14 +6832,80 @@
           <a:p>
             <a:r>
               <a:rPr lang="en-US" dirty="0" smtClean="0"/>
-              <a:t>&lt;Section&gt;</a:t>
-            </a:r>
-          </a:p>
-          <a:p>
+              <a:t>&lt;Section</a:t>
+            </a:r>
             <a:r>
               <a:rPr lang="en-US" dirty="0" smtClean="0"/>
-              <a:t>&lt;footer&gt;</a:t>
-            </a:r>
+              <a:t>&gt;</a:t>
+            </a:r>
+            <a:endParaRPr lang="bg-BG" dirty="0" smtClean="0"/>
+          </a:p>
+          <a:p>
+            <a:r>
+              <a:rPr lang="en-US" dirty="0" smtClean="0"/>
+              <a:t>&lt;aside&gt;</a:t>
+            </a:r>
+          </a:p>
+          <a:p>
+            <a:r>
+              <a:rPr lang="en-US" dirty="0" smtClean="0"/>
+              <a:t>&lt;article&gt;</a:t>
+            </a:r>
+            <a:endParaRPr lang="en-US" dirty="0" smtClean="0"/>
+          </a:p>
+          <a:p>
+            <a:r>
+              <a:rPr lang="en-US" dirty="0" smtClean="0"/>
+              <a:t>&lt;footer</a:t>
+            </a:r>
+            <a:r>
+              <a:rPr lang="en-US" dirty="0" smtClean="0"/>
+              <a:t>&gt;</a:t>
+            </a:r>
+          </a:p>
+          <a:p>
+            <a:r>
+              <a:rPr lang="bg-BG" dirty="0" err="1" smtClean="0"/>
+              <a:t>Повечве</a:t>
+            </a:r>
+            <a:r>
+              <a:rPr lang="bg-BG" dirty="0" smtClean="0"/>
+              <a:t> относно новите таговете на </a:t>
+            </a:r>
+            <a:r>
+              <a:rPr lang="en-US" dirty="0" smtClean="0"/>
+              <a:t>HTML5</a:t>
+            </a:r>
+            <a:r>
+              <a:rPr lang="bg-BG" dirty="0" smtClean="0"/>
+              <a:t>:</a:t>
+            </a:r>
+          </a:p>
+          <a:p>
+            <a:pPr marL="0" indent="0">
+              <a:buNone/>
+            </a:pPr>
+            <a:r>
+              <a:rPr lang="en-US" dirty="0" smtClean="0">
+                <a:hlinkClick r:id="rId2"/>
+              </a:rPr>
+              <a:t>http</a:t>
+            </a:r>
+            <a:r>
+              <a:rPr lang="en-US" dirty="0">
+                <a:hlinkClick r:id="rId2"/>
+              </a:rPr>
+              <a:t>://</a:t>
+            </a:r>
+            <a:r>
+              <a:rPr lang="en-US" dirty="0" smtClean="0">
+                <a:hlinkClick r:id="rId2"/>
+              </a:rPr>
+              <a:t>www.w3schools.com/html/html5_new_elements.asp</a:t>
+            </a:r>
+            <a:endParaRPr lang="bg-BG" dirty="0" smtClean="0"/>
+          </a:p>
+          <a:p>
             <a:endParaRPr lang="en-US" dirty="0"/>
           </a:p>
         </p:txBody>
@@ -6844,6 +6914,263 @@
     <p:extLst>
       <p:ext uri="{BB962C8B-B14F-4D97-AF65-F5344CB8AC3E}">
         <p14:creationId xmlns:p14="http://schemas.microsoft.com/office/powerpoint/2010/main" val="282580509"/>
+      </p:ext>
+    </p:extLst>
+  </p:cSld>
+  <p:clrMapOvr>
+    <a:masterClrMapping/>
+  </p:clrMapOvr>
+</p:sld>
+</file>
+
+<file path=ppt/slides/slide15.xml><?xml version="1.0" encoding="utf-8"?>
+<p:sld xmlns:a="http://schemas.openxmlformats.org/drawingml/2006/main" xmlns:r="http://schemas.openxmlformats.org/officeDocument/2006/relationships" xmlns:p="http://schemas.openxmlformats.org/presentationml/2006/main">
+  <p:cSld>
+    <p:spTree>
+      <p:nvGrpSpPr>
+        <p:cNvPr id="1" name=""/>
+        <p:cNvGrpSpPr/>
+        <p:nvPr/>
+      </p:nvGrpSpPr>
+      <p:grpSpPr>
+        <a:xfrm>
+          <a:off x="0" y="0"/>
+          <a:ext cx="0" cy="0"/>
+          <a:chOff x="0" y="0"/>
+          <a:chExt cx="0" cy="0"/>
+        </a:xfrm>
+      </p:grpSpPr>
+      <p:sp>
+        <p:nvSpPr>
+          <p:cNvPr id="2" name="Title 1"/>
+          <p:cNvSpPr>
+            <a:spLocks noGrp="1"/>
+          </p:cNvSpPr>
+          <p:nvPr>
+            <p:ph type="title"/>
+          </p:nvPr>
+        </p:nvSpPr>
+        <p:spPr>
+          <a:xfrm>
+            <a:off x="913775" y="173675"/>
+            <a:ext cx="10364451" cy="666586"/>
+          </a:xfrm>
+        </p:spPr>
+        <p:txBody>
+          <a:bodyPr/>
+          <a:lstStyle/>
+          <a:p>
+            <a:r>
+              <a:rPr lang="en-US" dirty="0" smtClean="0"/>
+              <a:t>HTML 5 </a:t>
+            </a:r>
+            <a:r>
+              <a:rPr lang="bg-BG" dirty="0" smtClean="0"/>
+              <a:t>ДЕМО</a:t>
+            </a:r>
+            <a:endParaRPr lang="en-US" dirty="0"/>
+          </a:p>
+        </p:txBody>
+      </p:sp>
+      <p:pic>
+        <p:nvPicPr>
+          <p:cNvPr id="1026" name="Picture 2" descr="http://media.mediatemple.netdna-cdn.com/wp-content/uploads/images/html5/html5_structure.png"/>
+          <p:cNvPicPr>
+            <a:picLocks noChangeAspect="1" noChangeArrowheads="1"/>
+          </p:cNvPicPr>
+          <p:nvPr/>
+        </p:nvPicPr>
+        <p:blipFill>
+          <a:blip r:embed="rId2">
+            <a:extLst>
+              <a:ext uri="{28A0092B-C50C-407E-A947-70E740481C1C}">
+                <a14:useLocalDpi xmlns:a14="http://schemas.microsoft.com/office/drawing/2010/main" val="0"/>
+              </a:ext>
+            </a:extLst>
+          </a:blip>
+          <a:srcRect/>
+          <a:stretch>
+            <a:fillRect/>
+          </a:stretch>
+        </p:blipFill>
+        <p:spPr bwMode="auto">
+          <a:xfrm>
+            <a:off x="2392856" y="1001024"/>
+            <a:ext cx="7406288" cy="5460859"/>
+          </a:xfrm>
+          <a:prstGeom prst="rect">
+            <a:avLst/>
+          </a:prstGeom>
+          <a:noFill/>
+          <a:extLst>
+            <a:ext uri="{909E8E84-426E-40DD-AFC4-6F175D3DCCD1}">
+              <a14:hiddenFill xmlns:a14="http://schemas.microsoft.com/office/drawing/2010/main">
+                <a:solidFill>
+                  <a:srgbClr val="FFFFFF"/>
+                </a:solidFill>
+              </a14:hiddenFill>
+            </a:ext>
+          </a:extLst>
+        </p:spPr>
+      </p:pic>
+    </p:spTree>
+    <p:extLst>
+      <p:ext uri="{BB962C8B-B14F-4D97-AF65-F5344CB8AC3E}">
+        <p14:creationId xmlns:p14="http://schemas.microsoft.com/office/powerpoint/2010/main" val="1591541222"/>
+      </p:ext>
+    </p:extLst>
+  </p:cSld>
+  <p:clrMapOvr>
+    <a:masterClrMapping/>
+  </p:clrMapOvr>
+</p:sld>
+</file>
+
+<file path=ppt/slides/slide16.xml><?xml version="1.0" encoding="utf-8"?>
+<p:sld xmlns:a="http://schemas.openxmlformats.org/drawingml/2006/main" xmlns:r="http://schemas.openxmlformats.org/officeDocument/2006/relationships" xmlns:p="http://schemas.openxmlformats.org/presentationml/2006/main">
+  <p:cSld>
+    <p:spTree>
+      <p:nvGrpSpPr>
+        <p:cNvPr id="1" name=""/>
+        <p:cNvGrpSpPr/>
+        <p:nvPr/>
+      </p:nvGrpSpPr>
+      <p:grpSpPr>
+        <a:xfrm>
+          <a:off x="0" y="0"/>
+          <a:ext cx="0" cy="0"/>
+          <a:chOff x="0" y="0"/>
+          <a:chExt cx="0" cy="0"/>
+        </a:xfrm>
+      </p:grpSpPr>
+      <p:sp>
+        <p:nvSpPr>
+          <p:cNvPr id="2" name="Title 1"/>
+          <p:cNvSpPr>
+            <a:spLocks noGrp="1"/>
+          </p:cNvSpPr>
+          <p:nvPr>
+            <p:ph type="title"/>
+          </p:nvPr>
+        </p:nvSpPr>
+        <p:spPr>
+          <a:xfrm>
+            <a:off x="971440" y="148961"/>
+            <a:ext cx="10364451" cy="641872"/>
+          </a:xfrm>
+        </p:spPr>
+        <p:txBody>
+          <a:bodyPr/>
+          <a:lstStyle/>
+          <a:p>
+            <a:r>
+              <a:rPr lang="bg-BG" dirty="0" smtClean="0"/>
+              <a:t>Какво трябва да запомним</a:t>
+            </a:r>
+            <a:endParaRPr lang="en-US" dirty="0"/>
+          </a:p>
+        </p:txBody>
+      </p:sp>
+      <p:sp>
+        <p:nvSpPr>
+          <p:cNvPr id="3" name="Content Placeholder 2"/>
+          <p:cNvSpPr>
+            <a:spLocks noGrp="1"/>
+          </p:cNvSpPr>
+          <p:nvPr>
+            <p:ph sz="quarter" idx="13"/>
+          </p:nvPr>
+        </p:nvSpPr>
+        <p:spPr/>
+        <p:txBody>
+          <a:bodyPr/>
+          <a:lstStyle/>
+          <a:p>
+            <a:r>
+              <a:rPr lang="en-US" dirty="0" err="1" smtClean="0"/>
+              <a:t>HTml</a:t>
+            </a:r>
+            <a:r>
+              <a:rPr lang="en-US" dirty="0" smtClean="0"/>
+              <a:t> </a:t>
+            </a:r>
+            <a:r>
+              <a:rPr lang="bg-BG" dirty="0" smtClean="0"/>
+              <a:t>изгражда структурата на една страница. Той не отговаря на дизайна!</a:t>
+            </a:r>
+          </a:p>
+          <a:p>
+            <a:r>
+              <a:rPr lang="bg-BG" dirty="0" smtClean="0"/>
+              <a:t> </a:t>
+            </a:r>
+            <a:r>
+              <a:rPr lang="bg-BG" dirty="0" err="1" smtClean="0"/>
+              <a:t>броузерите</a:t>
+            </a:r>
+            <a:r>
+              <a:rPr lang="bg-BG" dirty="0" smtClean="0"/>
+              <a:t> работят и с невалиден </a:t>
+            </a:r>
+            <a:r>
+              <a:rPr lang="en-US" dirty="0" smtClean="0"/>
+              <a:t>html</a:t>
+            </a:r>
+            <a:r>
+              <a:rPr lang="bg-BG" dirty="0" smtClean="0"/>
+              <a:t> – работа на програмиста е да не го допуска!</a:t>
+            </a:r>
+          </a:p>
+          <a:p>
+            <a:r>
+              <a:rPr lang="bg-BG" dirty="0" smtClean="0"/>
+              <a:t>Винаги мислете за семантиката на частите от сайта, върху които работите</a:t>
+            </a:r>
+          </a:p>
+          <a:p>
+            <a:r>
+              <a:rPr lang="bg-BG" dirty="0" smtClean="0"/>
+              <a:t>Може да валидирате </a:t>
+            </a:r>
+            <a:r>
+              <a:rPr lang="en-US" dirty="0" smtClean="0"/>
+              <a:t>html-a</a:t>
+            </a:r>
+            <a:r>
+              <a:rPr lang="bg-BG" dirty="0" smtClean="0"/>
+              <a:t> си тук:</a:t>
+            </a:r>
+          </a:p>
+          <a:p>
+            <a:pPr marL="0" indent="0">
+              <a:buNone/>
+            </a:pPr>
+            <a:r>
+              <a:rPr lang="en-US" dirty="0">
+                <a:hlinkClick r:id="rId2"/>
+              </a:rPr>
+              <a:t>http://validator.w3.org</a:t>
+            </a:r>
+            <a:r>
+              <a:rPr lang="en-US" dirty="0" smtClean="0">
+                <a:hlinkClick r:id="rId2"/>
+              </a:rPr>
+              <a:t>/</a:t>
+            </a:r>
+            <a:endParaRPr lang="bg-BG" smtClean="0"/>
+          </a:p>
+          <a:p>
+            <a:pPr marL="0" indent="0">
+              <a:buNone/>
+            </a:pPr>
+            <a:endParaRPr lang="en-US" dirty="0"/>
+          </a:p>
+        </p:txBody>
+      </p:sp>
+    </p:spTree>
+    <p:extLst>
+      <p:ext uri="{BB962C8B-B14F-4D97-AF65-F5344CB8AC3E}">
+        <p14:creationId xmlns:p14="http://schemas.microsoft.com/office/powerpoint/2010/main" val="2827281652"/>
       </p:ext>
     </p:extLst>
   </p:cSld>

</xml_diff>

<commit_message>
Updated HTML Basics presentation and examples
</commit_message>
<xml_diff>
--- a/02.html-basics.pptx
+++ b/02.html-basics.pptx
@@ -16,11 +16,13 @@
     <p:sldId id="264" r:id="rId10"/>
     <p:sldId id="265" r:id="rId11"/>
     <p:sldId id="266" r:id="rId12"/>
-    <p:sldId id="267" r:id="rId13"/>
-    <p:sldId id="268" r:id="rId14"/>
-    <p:sldId id="269" r:id="rId15"/>
-    <p:sldId id="270" r:id="rId16"/>
-    <p:sldId id="271" r:id="rId17"/>
+    <p:sldId id="272" r:id="rId13"/>
+    <p:sldId id="273" r:id="rId14"/>
+    <p:sldId id="267" r:id="rId15"/>
+    <p:sldId id="268" r:id="rId16"/>
+    <p:sldId id="269" r:id="rId17"/>
+    <p:sldId id="270" r:id="rId18"/>
+    <p:sldId id="271" r:id="rId19"/>
   </p:sldIdLst>
   <p:sldSz cx="12192000" cy="6858000"/>
   <p:notesSz cx="6858000" cy="9144000"/>
@@ -298,7 +300,7 @@
           <a:p>
             <a:fld id="{6A50DF0E-35A5-4CDB-8B61-7742E578C1F3}" type="datetimeFigureOut">
               <a:rPr lang="en-US" smtClean="0"/>
-              <a:t>11/12/2014</a:t>
+              <a:t>11/13/2014</a:t>
             </a:fld>
             <a:endParaRPr lang="en-US"/>
           </a:p>
@@ -610,7 +612,7 @@
           <a:p>
             <a:fld id="{6A50DF0E-35A5-4CDB-8B61-7742E578C1F3}" type="datetimeFigureOut">
               <a:rPr lang="en-US" smtClean="0"/>
-              <a:t>11/12/2014</a:t>
+              <a:t>11/13/2014</a:t>
             </a:fld>
             <a:endParaRPr lang="en-US"/>
           </a:p>
@@ -832,7 +834,7 @@
           <a:p>
             <a:fld id="{6A50DF0E-35A5-4CDB-8B61-7742E578C1F3}" type="datetimeFigureOut">
               <a:rPr lang="en-US" smtClean="0"/>
-              <a:t>11/12/2014</a:t>
+              <a:t>11/13/2014</a:t>
             </a:fld>
             <a:endParaRPr lang="en-US"/>
           </a:p>
@@ -1123,7 +1125,7 @@
           <a:p>
             <a:fld id="{6A50DF0E-35A5-4CDB-8B61-7742E578C1F3}" type="datetimeFigureOut">
               <a:rPr lang="en-US" smtClean="0"/>
-              <a:t>11/12/2014</a:t>
+              <a:t>11/13/2014</a:t>
             </a:fld>
             <a:endParaRPr lang="en-US"/>
           </a:p>
@@ -1577,7 +1579,7 @@
           <a:p>
             <a:fld id="{6A50DF0E-35A5-4CDB-8B61-7742E578C1F3}" type="datetimeFigureOut">
               <a:rPr lang="en-US" smtClean="0"/>
-              <a:t>11/12/2014</a:t>
+              <a:t>11/13/2014</a:t>
             </a:fld>
             <a:endParaRPr lang="en-US"/>
           </a:p>
@@ -2153,7 +2155,7 @@
           <a:p>
             <a:fld id="{6A50DF0E-35A5-4CDB-8B61-7742E578C1F3}" type="datetimeFigureOut">
               <a:rPr lang="en-US" smtClean="0"/>
-              <a:t>11/12/2014</a:t>
+              <a:t>11/13/2014</a:t>
             </a:fld>
             <a:endParaRPr lang="en-US"/>
           </a:p>
@@ -3005,7 +3007,7 @@
           <a:p>
             <a:fld id="{6A50DF0E-35A5-4CDB-8B61-7742E578C1F3}" type="datetimeFigureOut">
               <a:rPr lang="en-US" smtClean="0"/>
-              <a:t>11/12/2014</a:t>
+              <a:t>11/13/2014</a:t>
             </a:fld>
             <a:endParaRPr lang="en-US"/>
           </a:p>
@@ -3210,7 +3212,7 @@
           <a:p>
             <a:fld id="{6A50DF0E-35A5-4CDB-8B61-7742E578C1F3}" type="datetimeFigureOut">
               <a:rPr lang="en-US" smtClean="0"/>
-              <a:t>11/12/2014</a:t>
+              <a:t>11/13/2014</a:t>
             </a:fld>
             <a:endParaRPr lang="en-US"/>
           </a:p>
@@ -3424,7 +3426,7 @@
           <a:p>
             <a:fld id="{6A50DF0E-35A5-4CDB-8B61-7742E578C1F3}" type="datetimeFigureOut">
               <a:rPr lang="en-US" smtClean="0"/>
-              <a:t>11/12/2014</a:t>
+              <a:t>11/13/2014</a:t>
             </a:fld>
             <a:endParaRPr lang="en-US"/>
           </a:p>
@@ -3629,7 +3631,7 @@
           <a:p>
             <a:fld id="{6A50DF0E-35A5-4CDB-8B61-7742E578C1F3}" type="datetimeFigureOut">
               <a:rPr lang="en-US" smtClean="0"/>
-              <a:t>11/12/2014</a:t>
+              <a:t>11/13/2014</a:t>
             </a:fld>
             <a:endParaRPr lang="en-US"/>
           </a:p>
@@ -3909,7 +3911,7 @@
           <a:p>
             <a:fld id="{6A50DF0E-35A5-4CDB-8B61-7742E578C1F3}" type="datetimeFigureOut">
               <a:rPr lang="en-US" smtClean="0"/>
-              <a:t>11/12/2014</a:t>
+              <a:t>11/13/2014</a:t>
             </a:fld>
             <a:endParaRPr lang="en-US"/>
           </a:p>
@@ -4176,7 +4178,7 @@
           <a:p>
             <a:fld id="{6A50DF0E-35A5-4CDB-8B61-7742E578C1F3}" type="datetimeFigureOut">
               <a:rPr lang="en-US" smtClean="0"/>
-              <a:t>11/12/2014</a:t>
+              <a:t>11/13/2014</a:t>
             </a:fld>
             <a:endParaRPr lang="en-US"/>
           </a:p>
@@ -4591,7 +4593,7 @@
           <a:p>
             <a:fld id="{6A50DF0E-35A5-4CDB-8B61-7742E578C1F3}" type="datetimeFigureOut">
               <a:rPr lang="en-US" smtClean="0"/>
-              <a:t>11/12/2014</a:t>
+              <a:t>11/13/2014</a:t>
             </a:fld>
             <a:endParaRPr lang="en-US"/>
           </a:p>
@@ -4739,7 +4741,7 @@
           <a:p>
             <a:fld id="{6A50DF0E-35A5-4CDB-8B61-7742E578C1F3}" type="datetimeFigureOut">
               <a:rPr lang="en-US" smtClean="0"/>
-              <a:t>11/12/2014</a:t>
+              <a:t>11/13/2014</a:t>
             </a:fld>
             <a:endParaRPr lang="en-US"/>
           </a:p>
@@ -4864,7 +4866,7 @@
           <a:p>
             <a:fld id="{6A50DF0E-35A5-4CDB-8B61-7742E578C1F3}" type="datetimeFigureOut">
               <a:rPr lang="en-US" smtClean="0"/>
-              <a:t>11/12/2014</a:t>
+              <a:t>11/13/2014</a:t>
             </a:fld>
             <a:endParaRPr lang="en-US"/>
           </a:p>
@@ -5143,7 +5145,7 @@
           <a:p>
             <a:fld id="{6A50DF0E-35A5-4CDB-8B61-7742E578C1F3}" type="datetimeFigureOut">
               <a:rPr lang="en-US" smtClean="0"/>
-              <a:t>11/12/2014</a:t>
+              <a:t>11/13/2014</a:t>
             </a:fld>
             <a:endParaRPr lang="en-US"/>
           </a:p>
@@ -5455,7 +5457,7 @@
           <a:p>
             <a:fld id="{6A50DF0E-35A5-4CDB-8B61-7742E578C1F3}" type="datetimeFigureOut">
               <a:rPr lang="en-US" smtClean="0"/>
-              <a:t>11/12/2014</a:t>
+              <a:t>11/13/2014</a:t>
             </a:fld>
             <a:endParaRPr lang="en-US"/>
           </a:p>
@@ -5708,7 +5710,7 @@
           <a:p>
             <a:fld id="{6A50DF0E-35A5-4CDB-8B61-7742E578C1F3}" type="datetimeFigureOut">
               <a:rPr lang="en-US" smtClean="0"/>
-              <a:t>11/12/2014</a:t>
+              <a:t>11/13/2014</a:t>
             </a:fld>
             <a:endParaRPr lang="en-US"/>
           </a:p>
@@ -6489,56 +6491,68 @@
             <p:ph type="title"/>
           </p:nvPr>
         </p:nvSpPr>
-        <p:spPr>
-          <a:xfrm>
-            <a:off x="913774" y="239577"/>
-            <a:ext cx="10364451" cy="839580"/>
-          </a:xfrm>
-        </p:spPr>
-        <p:txBody>
-          <a:bodyPr/>
-          <a:lstStyle/>
-          <a:p>
+        <p:spPr/>
+        <p:txBody>
+          <a:bodyPr/>
+          <a:lstStyle/>
+          <a:p>
+            <a:r>
+              <a:rPr lang="en-US" dirty="0" smtClean="0"/>
+              <a:t>HTML </a:t>
+            </a:r>
             <a:r>
               <a:rPr lang="bg-BG" dirty="0" smtClean="0"/>
-              <a:t>Семантична структура на </a:t>
-            </a:r>
-            <a:r>
-              <a:rPr lang="en-US" dirty="0" smtClean="0"/>
-              <a:t>html</a:t>
+              <a:t>Таблици</a:t>
             </a:r>
             <a:endParaRPr lang="en-US" dirty="0"/>
           </a:p>
         </p:txBody>
       </p:sp>
-      <p:pic>
-        <p:nvPicPr>
-          <p:cNvPr id="4" name="Picture 3"/>
-          <p:cNvPicPr>
-            <a:picLocks noChangeAspect="1"/>
-          </p:cNvPicPr>
-          <p:nvPr/>
-        </p:nvPicPr>
-        <p:blipFill>
-          <a:blip r:embed="rId2"/>
-          <a:stretch>
-            <a:fillRect/>
-          </a:stretch>
-        </p:blipFill>
-        <p:spPr>
-          <a:xfrm>
-            <a:off x="1597826" y="1079157"/>
-            <a:ext cx="8996345" cy="5548144"/>
-          </a:xfrm>
-          <a:prstGeom prst="rect">
-            <a:avLst/>
-          </a:prstGeom>
-        </p:spPr>
-      </p:pic>
+      <p:sp>
+        <p:nvSpPr>
+          <p:cNvPr id="3" name="Content Placeholder 2"/>
+          <p:cNvSpPr>
+            <a:spLocks noGrp="1"/>
+          </p:cNvSpPr>
+          <p:nvPr>
+            <p:ph sz="quarter" idx="13"/>
+          </p:nvPr>
+        </p:nvSpPr>
+        <p:spPr/>
+        <p:txBody>
+          <a:bodyPr/>
+          <a:lstStyle/>
+          <a:p>
+            <a:r>
+              <a:rPr lang="bg-BG" dirty="0" smtClean="0"/>
+              <a:t>Части на таблицата</a:t>
+            </a:r>
+          </a:p>
+          <a:p>
+            <a:r>
+              <a:rPr lang="bg-BG" dirty="0" smtClean="0"/>
+              <a:t>Редове и колони</a:t>
+            </a:r>
+          </a:p>
+          <a:p>
+            <a:r>
+              <a:rPr lang="bg-BG" dirty="0" smtClean="0"/>
+              <a:t>Атрибути за таблица</a:t>
+            </a:r>
+          </a:p>
+          <a:p>
+            <a:r>
+              <a:rPr lang="bg-BG" dirty="0" smtClean="0"/>
+              <a:t>Избягвайте да използвате таблица, за да оформяте структурата на страницата</a:t>
+            </a:r>
+            <a:endParaRPr lang="en-US" dirty="0"/>
+          </a:p>
+        </p:txBody>
+      </p:sp>
     </p:spTree>
     <p:extLst>
       <p:ext uri="{BB962C8B-B14F-4D97-AF65-F5344CB8AC3E}">
-        <p14:creationId xmlns:p14="http://schemas.microsoft.com/office/powerpoint/2010/main" val="67314733"/>
+        <p14:creationId xmlns:p14="http://schemas.microsoft.com/office/powerpoint/2010/main" val="1307277464"/>
       </p:ext>
     </p:extLst>
   </p:cSld>
@@ -6575,7 +6589,12 @@
             <p:ph type="title"/>
           </p:nvPr>
         </p:nvSpPr>
-        <p:spPr/>
+        <p:spPr>
+          <a:xfrm>
+            <a:off x="971525" y="124247"/>
+            <a:ext cx="10364451" cy="798391"/>
+          </a:xfrm>
+        </p:spPr>
         <p:txBody>
           <a:bodyPr/>
           <a:lstStyle/>
@@ -6586,146 +6605,57 @@
             </a:r>
             <a:r>
               <a:rPr lang="bg-BG" dirty="0" smtClean="0"/>
-              <a:t>Задача</a:t>
+              <a:t>таблици демо</a:t>
             </a:r>
             <a:endParaRPr lang="en-US" dirty="0"/>
           </a:p>
         </p:txBody>
       </p:sp>
-      <p:sp>
-        <p:nvSpPr>
-          <p:cNvPr id="4" name="Content Placeholder 2"/>
-          <p:cNvSpPr>
-            <a:spLocks noGrp="1"/>
-          </p:cNvSpPr>
-          <p:nvPr>
-            <p:ph sz="quarter" idx="13"/>
-          </p:nvPr>
-        </p:nvSpPr>
-        <p:spPr>
-          <a:xfrm>
-            <a:off x="913774" y="2367092"/>
-            <a:ext cx="10363826" cy="3218162"/>
-          </a:xfrm>
-        </p:spPr>
-        <p:txBody>
-          <a:bodyPr>
-            <a:normAutofit fontScale="70000" lnSpcReduction="20000"/>
-          </a:bodyPr>
-          <a:lstStyle/>
-          <a:p>
-            <a:pPr marL="0" indent="0">
-              <a:buNone/>
-            </a:pPr>
-            <a:r>
-              <a:rPr lang="bg-BG" dirty="0" smtClean="0"/>
-              <a:t>Спазвайки семантичната структура на </a:t>
-            </a:r>
-            <a:r>
-              <a:rPr lang="en-US" dirty="0" smtClean="0"/>
-              <a:t>HTML</a:t>
-            </a:r>
-            <a:r>
-              <a:rPr lang="bg-BG" dirty="0" smtClean="0"/>
-              <a:t>, създайте страница която ви описва.</a:t>
-            </a:r>
-          </a:p>
-          <a:p>
-            <a:pPr marL="0" indent="0">
-              <a:buNone/>
-            </a:pPr>
-            <a:r>
-              <a:rPr lang="bg-BG" dirty="0" smtClean="0"/>
-              <a:t>Страницата трябва да съдържа:</a:t>
-            </a:r>
-          </a:p>
-          <a:p>
-            <a:pPr marL="457200" indent="-457200">
-              <a:buAutoNum type="arabicParenR"/>
-            </a:pPr>
-            <a:r>
-              <a:rPr lang="bg-BG" dirty="0" smtClean="0"/>
-              <a:t>Заглави съдържащо името ви</a:t>
-            </a:r>
-          </a:p>
-          <a:p>
-            <a:pPr marL="457200" indent="-457200">
-              <a:buAutoNum type="arabicParenR"/>
-            </a:pPr>
-            <a:r>
-              <a:rPr lang="bg-BG" dirty="0" smtClean="0"/>
-              <a:t>Ваша снимка по избор</a:t>
-            </a:r>
-          </a:p>
-          <a:p>
-            <a:pPr marL="457200" indent="-457200">
-              <a:buAutoNum type="arabicParenR"/>
-            </a:pPr>
-            <a:r>
-              <a:rPr lang="bg-BG" dirty="0" smtClean="0"/>
-              <a:t>Кратко описание или история за вас, историята трябва да има подзаглавие</a:t>
-            </a:r>
-          </a:p>
-          <a:p>
-            <a:pPr marL="457200" indent="-457200">
-              <a:buAutoNum type="arabicParenR"/>
-            </a:pPr>
-            <a:r>
-              <a:rPr lang="bg-BG" dirty="0" smtClean="0"/>
-              <a:t>Подреден списък с нещата, които обичате да правите в свободното си време</a:t>
-            </a:r>
-          </a:p>
-          <a:p>
-            <a:pPr marL="457200" indent="-457200">
-              <a:buAutoNum type="arabicParenR"/>
-            </a:pPr>
-            <a:r>
-              <a:rPr lang="bg-BG" dirty="0" smtClean="0"/>
-              <a:t>Линк към любима ваша страница</a:t>
-            </a:r>
-          </a:p>
-          <a:p>
-            <a:pPr marL="457200" indent="-457200">
-              <a:buAutoNum type="arabicParenR"/>
-            </a:pPr>
-            <a:r>
-              <a:rPr lang="bg-BG" dirty="0" smtClean="0"/>
-              <a:t>Неподреден списък с любимите ви ястия</a:t>
-            </a:r>
-          </a:p>
-          <a:p>
-            <a:pPr marL="457200" indent="-457200">
-              <a:buAutoNum type="arabicParenR"/>
-            </a:pPr>
-            <a:r>
-              <a:rPr lang="bg-BG" dirty="0" smtClean="0"/>
-              <a:t>Място за попълване на коментари</a:t>
-            </a:r>
-          </a:p>
-          <a:p>
-            <a:pPr marL="457200" indent="-457200">
-              <a:buAutoNum type="arabicParenR"/>
-            </a:pPr>
-            <a:endParaRPr lang="bg-BG" dirty="0" smtClean="0"/>
-          </a:p>
-          <a:p>
-            <a:pPr marL="457200" indent="-457200">
-              <a:buAutoNum type="arabicParenR"/>
-            </a:pPr>
-            <a:endParaRPr lang="bg-BG" dirty="0" smtClean="0"/>
-          </a:p>
-          <a:p>
-            <a:pPr marL="457200" indent="-457200">
-              <a:buAutoNum type="arabicParenR"/>
-            </a:pPr>
-            <a:endParaRPr lang="en-US" dirty="0"/>
-          </a:p>
-        </p:txBody>
-      </p:sp>
+      <p:pic>
+        <p:nvPicPr>
+          <p:cNvPr id="1026" name="Picture 2" descr="http://content.w3avenue.com/2008/components/cover-your-tables-with-tablecloth/cover.jpg"/>
+          <p:cNvPicPr>
+            <a:picLocks noChangeAspect="1" noChangeArrowheads="1"/>
+          </p:cNvPicPr>
+          <p:nvPr/>
+        </p:nvPicPr>
+        <p:blipFill>
+          <a:blip r:embed="rId2">
+            <a:extLst>
+              <a:ext uri="{28A0092B-C50C-407E-A947-70E740481C1C}">
+                <a14:useLocalDpi xmlns:a14="http://schemas.microsoft.com/office/drawing/2010/main" val="0"/>
+              </a:ext>
+            </a:extLst>
+          </a:blip>
+          <a:srcRect/>
+          <a:stretch>
+            <a:fillRect/>
+          </a:stretch>
+        </p:blipFill>
+        <p:spPr bwMode="auto">
+          <a:xfrm>
+            <a:off x="960418" y="1229496"/>
+            <a:ext cx="10375558" cy="5187779"/>
+          </a:xfrm>
+          <a:prstGeom prst="rect">
+            <a:avLst/>
+          </a:prstGeom>
+          <a:noFill/>
+          <a:extLst>
+            <a:ext uri="{909E8E84-426E-40DD-AFC4-6F175D3DCCD1}">
+              <a14:hiddenFill xmlns:a14="http://schemas.microsoft.com/office/drawing/2010/main">
+                <a:solidFill>
+                  <a:srgbClr val="FFFFFF"/>
+                </a:solidFill>
+              </a14:hiddenFill>
+            </a:ext>
+          </a:extLst>
+        </p:spPr>
+      </p:pic>
     </p:spTree>
     <p:extLst>
       <p:ext uri="{BB962C8B-B14F-4D97-AF65-F5344CB8AC3E}">
-        <p14:creationId xmlns:p14="http://schemas.microsoft.com/office/powerpoint/2010/main" val="1216366924"/>
+        <p14:creationId xmlns:p14="http://schemas.microsoft.com/office/powerpoint/2010/main" val="1828138525"/>
       </p:ext>
     </p:extLst>
   </p:cSld>
@@ -6762,158 +6692,56 @@
             <p:ph type="title"/>
           </p:nvPr>
         </p:nvSpPr>
-        <p:spPr/>
-        <p:txBody>
-          <a:bodyPr/>
-          <a:lstStyle/>
-          <a:p>
+        <p:spPr>
+          <a:xfrm>
+            <a:off x="913774" y="239577"/>
+            <a:ext cx="10364451" cy="839580"/>
+          </a:xfrm>
+        </p:spPr>
+        <p:txBody>
+          <a:bodyPr/>
+          <a:lstStyle/>
+          <a:p>
+            <a:r>
+              <a:rPr lang="bg-BG" dirty="0" smtClean="0"/>
+              <a:t>Семантична структура на </a:t>
+            </a:r>
             <a:r>
               <a:rPr lang="en-US" dirty="0" smtClean="0"/>
-              <a:t>HTML 5 </a:t>
-            </a:r>
-            <a:r>
-              <a:rPr lang="bg-BG" dirty="0" smtClean="0"/>
-              <a:t>крачка напред</a:t>
+              <a:t>html</a:t>
             </a:r>
             <a:endParaRPr lang="en-US" dirty="0"/>
           </a:p>
         </p:txBody>
       </p:sp>
-      <p:sp>
-        <p:nvSpPr>
-          <p:cNvPr id="3" name="Content Placeholder 2"/>
-          <p:cNvSpPr>
-            <a:spLocks noGrp="1"/>
-          </p:cNvSpPr>
-          <p:nvPr>
-            <p:ph sz="quarter" idx="13"/>
-          </p:nvPr>
-        </p:nvSpPr>
-        <p:spPr/>
-        <p:txBody>
-          <a:bodyPr>
-            <a:normAutofit fontScale="77500" lnSpcReduction="20000"/>
-          </a:bodyPr>
-          <a:lstStyle/>
-          <a:p>
-            <a:r>
-              <a:rPr lang="en-US" dirty="0" err="1" smtClean="0"/>
-              <a:t>hTML</a:t>
-            </a:r>
-            <a:r>
-              <a:rPr lang="en-US" dirty="0" smtClean="0"/>
-              <a:t> 5 </a:t>
-            </a:r>
-            <a:r>
-              <a:rPr lang="bg-BG" dirty="0" smtClean="0"/>
-              <a:t>разполага с тагове, които определят разположението на частите от сайта</a:t>
-            </a:r>
-          </a:p>
-          <a:p>
-            <a:r>
-              <a:rPr lang="en-US" dirty="0" smtClean="0"/>
-              <a:t>&lt;Header&gt;</a:t>
-            </a:r>
-          </a:p>
-          <a:p>
-            <a:r>
-              <a:rPr lang="en-US" dirty="0" smtClean="0"/>
-              <a:t>&lt;</a:t>
-            </a:r>
-            <a:r>
-              <a:rPr lang="en-US" dirty="0" err="1" smtClean="0"/>
-              <a:t>Nav</a:t>
-            </a:r>
-            <a:r>
-              <a:rPr lang="en-US" dirty="0" smtClean="0"/>
-              <a:t>&gt;</a:t>
-            </a:r>
-          </a:p>
-          <a:p>
-            <a:r>
-              <a:rPr lang="en-US" dirty="0" smtClean="0"/>
-              <a:t>&lt;Section</a:t>
-            </a:r>
-            <a:r>
-              <a:rPr lang="en-US" dirty="0" smtClean="0"/>
-              <a:t>&gt;</a:t>
-            </a:r>
-            <a:endParaRPr lang="bg-BG" dirty="0" smtClean="0"/>
-          </a:p>
-          <a:p>
-            <a:r>
-              <a:rPr lang="en-US" dirty="0" smtClean="0"/>
-              <a:t>&lt;aside&gt;</a:t>
-            </a:r>
-          </a:p>
-          <a:p>
-            <a:r>
-              <a:rPr lang="en-US" dirty="0" smtClean="0"/>
-              <a:t>&lt;article&gt;</a:t>
-            </a:r>
-            <a:endParaRPr lang="en-US" dirty="0" smtClean="0"/>
-          </a:p>
-          <a:p>
-            <a:r>
-              <a:rPr lang="en-US" dirty="0" smtClean="0"/>
-              <a:t>&lt;footer</a:t>
-            </a:r>
-            <a:r>
-              <a:rPr lang="en-US" dirty="0" smtClean="0"/>
-              <a:t>&gt;</a:t>
-            </a:r>
-          </a:p>
-          <a:p>
-            <a:r>
-              <a:rPr lang="bg-BG" dirty="0" err="1" smtClean="0"/>
-              <a:t>Повечве</a:t>
-            </a:r>
-            <a:r>
-              <a:rPr lang="bg-BG" dirty="0" smtClean="0"/>
-              <a:t> относно новите таговете на </a:t>
-            </a:r>
-            <a:r>
-              <a:rPr lang="en-US" dirty="0" smtClean="0"/>
-              <a:t>HTML5</a:t>
-            </a:r>
-            <a:r>
-              <a:rPr lang="bg-BG" dirty="0" smtClean="0"/>
-              <a:t>:</a:t>
-            </a:r>
-          </a:p>
-          <a:p>
-            <a:pPr marL="0" indent="0">
-              <a:buNone/>
-            </a:pPr>
-            <a:r>
-              <a:rPr lang="en-US" dirty="0" smtClean="0">
-                <a:hlinkClick r:id="rId2"/>
-              </a:rPr>
-              <a:t>http</a:t>
-            </a:r>
-            <a:r>
-              <a:rPr lang="en-US" dirty="0">
-                <a:hlinkClick r:id="rId2"/>
-              </a:rPr>
-              <a:t>://</a:t>
-            </a:r>
-            <a:r>
-              <a:rPr lang="en-US" dirty="0" smtClean="0">
-                <a:hlinkClick r:id="rId2"/>
-              </a:rPr>
-              <a:t>www.w3schools.com/html/html5_new_elements.asp</a:t>
-            </a:r>
-            <a:endParaRPr lang="bg-BG" dirty="0" smtClean="0"/>
-          </a:p>
-          <a:p>
-            <a:endParaRPr lang="en-US" dirty="0"/>
-          </a:p>
-        </p:txBody>
-      </p:sp>
+      <p:pic>
+        <p:nvPicPr>
+          <p:cNvPr id="4" name="Picture 3"/>
+          <p:cNvPicPr>
+            <a:picLocks noChangeAspect="1"/>
+          </p:cNvPicPr>
+          <p:nvPr/>
+        </p:nvPicPr>
+        <p:blipFill>
+          <a:blip r:embed="rId2"/>
+          <a:stretch>
+            <a:fillRect/>
+          </a:stretch>
+        </p:blipFill>
+        <p:spPr>
+          <a:xfrm>
+            <a:off x="1597826" y="1079157"/>
+            <a:ext cx="8996345" cy="5548144"/>
+          </a:xfrm>
+          <a:prstGeom prst="rect">
+            <a:avLst/>
+          </a:prstGeom>
+        </p:spPr>
+      </p:pic>
     </p:spTree>
     <p:extLst>
       <p:ext uri="{BB962C8B-B14F-4D97-AF65-F5344CB8AC3E}">
-        <p14:creationId xmlns:p14="http://schemas.microsoft.com/office/powerpoint/2010/main" val="282580509"/>
+        <p14:creationId xmlns:p14="http://schemas.microsoft.com/office/powerpoint/2010/main" val="67314733"/>
       </p:ext>
     </p:extLst>
   </p:cSld>
@@ -6950,6 +6778,372 @@
             <p:ph type="title"/>
           </p:nvPr>
         </p:nvSpPr>
+        <p:spPr/>
+        <p:txBody>
+          <a:bodyPr/>
+          <a:lstStyle/>
+          <a:p>
+            <a:r>
+              <a:rPr lang="en-US" dirty="0" smtClean="0"/>
+              <a:t>HTML </a:t>
+            </a:r>
+            <a:r>
+              <a:rPr lang="bg-BG" dirty="0" smtClean="0"/>
+              <a:t>Задача</a:t>
+            </a:r>
+            <a:endParaRPr lang="en-US" dirty="0"/>
+          </a:p>
+        </p:txBody>
+      </p:sp>
+      <p:sp>
+        <p:nvSpPr>
+          <p:cNvPr id="4" name="Content Placeholder 2"/>
+          <p:cNvSpPr>
+            <a:spLocks noGrp="1"/>
+          </p:cNvSpPr>
+          <p:nvPr>
+            <p:ph sz="quarter" idx="13"/>
+          </p:nvPr>
+        </p:nvSpPr>
+        <p:spPr>
+          <a:xfrm>
+            <a:off x="913774" y="2367092"/>
+            <a:ext cx="10363826" cy="3218162"/>
+          </a:xfrm>
+        </p:spPr>
+        <p:txBody>
+          <a:bodyPr>
+            <a:normAutofit fontScale="70000" lnSpcReduction="20000"/>
+          </a:bodyPr>
+          <a:lstStyle/>
+          <a:p>
+            <a:pPr marL="0" indent="0">
+              <a:buNone/>
+            </a:pPr>
+            <a:r>
+              <a:rPr lang="bg-BG" dirty="0" smtClean="0"/>
+              <a:t>Спазвайки семантичната структура на </a:t>
+            </a:r>
+            <a:r>
+              <a:rPr lang="en-US" dirty="0" smtClean="0"/>
+              <a:t>HTML</a:t>
+            </a:r>
+            <a:r>
+              <a:rPr lang="bg-BG" dirty="0" smtClean="0"/>
+              <a:t>, създайте страница която ви описва.</a:t>
+            </a:r>
+          </a:p>
+          <a:p>
+            <a:pPr marL="0" indent="0">
+              <a:buNone/>
+            </a:pPr>
+            <a:r>
+              <a:rPr lang="bg-BG" dirty="0" smtClean="0"/>
+              <a:t>Страницата трябва да съдържа:</a:t>
+            </a:r>
+          </a:p>
+          <a:p>
+            <a:pPr marL="457200" indent="-457200">
+              <a:buAutoNum type="arabicParenR"/>
+            </a:pPr>
+            <a:r>
+              <a:rPr lang="bg-BG" dirty="0" smtClean="0"/>
+              <a:t>Заглави съдържащо името ви</a:t>
+            </a:r>
+          </a:p>
+          <a:p>
+            <a:pPr marL="457200" indent="-457200">
+              <a:buAutoNum type="arabicParenR"/>
+            </a:pPr>
+            <a:r>
+              <a:rPr lang="bg-BG" dirty="0" smtClean="0"/>
+              <a:t>Ваша снимка по избор</a:t>
+            </a:r>
+          </a:p>
+          <a:p>
+            <a:pPr marL="457200" indent="-457200">
+              <a:buAutoNum type="arabicParenR"/>
+            </a:pPr>
+            <a:r>
+              <a:rPr lang="bg-BG" dirty="0" smtClean="0"/>
+              <a:t>Кратко описание или история за вас, историята трябва да има подзаглавие</a:t>
+            </a:r>
+          </a:p>
+          <a:p>
+            <a:pPr marL="457200" indent="-457200">
+              <a:buAutoNum type="arabicParenR"/>
+            </a:pPr>
+            <a:r>
+              <a:rPr lang="bg-BG" dirty="0" smtClean="0"/>
+              <a:t>Подреден списък с нещата, които обичате да правите в свободното си време</a:t>
+            </a:r>
+          </a:p>
+          <a:p>
+            <a:pPr marL="457200" indent="-457200">
+              <a:buAutoNum type="arabicParenR"/>
+            </a:pPr>
+            <a:r>
+              <a:rPr lang="bg-BG" dirty="0" smtClean="0"/>
+              <a:t>Линк към любима ваша страница</a:t>
+            </a:r>
+          </a:p>
+          <a:p>
+            <a:pPr marL="457200" indent="-457200">
+              <a:buAutoNum type="arabicParenR"/>
+            </a:pPr>
+            <a:r>
+              <a:rPr lang="bg-BG" dirty="0" smtClean="0"/>
+              <a:t>Неподреден списък с любимите ви ястия</a:t>
+            </a:r>
+          </a:p>
+          <a:p>
+            <a:pPr marL="457200" indent="-457200">
+              <a:buAutoNum type="arabicParenR"/>
+            </a:pPr>
+            <a:r>
+              <a:rPr lang="bg-BG" dirty="0" smtClean="0"/>
+              <a:t>Място за попълване на коментари</a:t>
+            </a:r>
+          </a:p>
+          <a:p>
+            <a:pPr marL="457200" indent="-457200">
+              <a:buAutoNum type="arabicParenR"/>
+            </a:pPr>
+            <a:endParaRPr lang="bg-BG" dirty="0" smtClean="0"/>
+          </a:p>
+          <a:p>
+            <a:pPr marL="457200" indent="-457200">
+              <a:buAutoNum type="arabicParenR"/>
+            </a:pPr>
+            <a:endParaRPr lang="bg-BG" dirty="0" smtClean="0"/>
+          </a:p>
+          <a:p>
+            <a:pPr marL="457200" indent="-457200">
+              <a:buAutoNum type="arabicParenR"/>
+            </a:pPr>
+            <a:endParaRPr lang="en-US" dirty="0"/>
+          </a:p>
+        </p:txBody>
+      </p:sp>
+    </p:spTree>
+    <p:extLst>
+      <p:ext uri="{BB962C8B-B14F-4D97-AF65-F5344CB8AC3E}">
+        <p14:creationId xmlns:p14="http://schemas.microsoft.com/office/powerpoint/2010/main" val="1216366924"/>
+      </p:ext>
+    </p:extLst>
+  </p:cSld>
+  <p:clrMapOvr>
+    <a:masterClrMapping/>
+  </p:clrMapOvr>
+</p:sld>
+</file>
+
+<file path=ppt/slides/slide16.xml><?xml version="1.0" encoding="utf-8"?>
+<p:sld xmlns:a="http://schemas.openxmlformats.org/drawingml/2006/main" xmlns:r="http://schemas.openxmlformats.org/officeDocument/2006/relationships" xmlns:p="http://schemas.openxmlformats.org/presentationml/2006/main">
+  <p:cSld>
+    <p:spTree>
+      <p:nvGrpSpPr>
+        <p:cNvPr id="1" name=""/>
+        <p:cNvGrpSpPr/>
+        <p:nvPr/>
+      </p:nvGrpSpPr>
+      <p:grpSpPr>
+        <a:xfrm>
+          <a:off x="0" y="0"/>
+          <a:ext cx="0" cy="0"/>
+          <a:chOff x="0" y="0"/>
+          <a:chExt cx="0" cy="0"/>
+        </a:xfrm>
+      </p:grpSpPr>
+      <p:sp>
+        <p:nvSpPr>
+          <p:cNvPr id="2" name="Title 1"/>
+          <p:cNvSpPr>
+            <a:spLocks noGrp="1"/>
+          </p:cNvSpPr>
+          <p:nvPr>
+            <p:ph type="title"/>
+          </p:nvPr>
+        </p:nvSpPr>
+        <p:spPr/>
+        <p:txBody>
+          <a:bodyPr/>
+          <a:lstStyle/>
+          <a:p>
+            <a:r>
+              <a:rPr lang="en-US" dirty="0" smtClean="0"/>
+              <a:t>HTML 5 </a:t>
+            </a:r>
+            <a:r>
+              <a:rPr lang="bg-BG" dirty="0" smtClean="0"/>
+              <a:t>крачка напред</a:t>
+            </a:r>
+            <a:endParaRPr lang="en-US" dirty="0"/>
+          </a:p>
+        </p:txBody>
+      </p:sp>
+      <p:sp>
+        <p:nvSpPr>
+          <p:cNvPr id="3" name="Content Placeholder 2"/>
+          <p:cNvSpPr>
+            <a:spLocks noGrp="1"/>
+          </p:cNvSpPr>
+          <p:nvPr>
+            <p:ph sz="quarter" idx="13"/>
+          </p:nvPr>
+        </p:nvSpPr>
+        <p:spPr/>
+        <p:txBody>
+          <a:bodyPr>
+            <a:normAutofit fontScale="77500" lnSpcReduction="20000"/>
+          </a:bodyPr>
+          <a:lstStyle/>
+          <a:p>
+            <a:r>
+              <a:rPr lang="en-US" dirty="0" err="1" smtClean="0"/>
+              <a:t>hTML</a:t>
+            </a:r>
+            <a:r>
+              <a:rPr lang="en-US" dirty="0" smtClean="0"/>
+              <a:t> 5 </a:t>
+            </a:r>
+            <a:r>
+              <a:rPr lang="bg-BG" dirty="0" smtClean="0"/>
+              <a:t>разполага с тагове, които определят разположението на частите от сайта</a:t>
+            </a:r>
+          </a:p>
+          <a:p>
+            <a:r>
+              <a:rPr lang="en-US" dirty="0" smtClean="0"/>
+              <a:t>&lt;Header&gt;</a:t>
+            </a:r>
+          </a:p>
+          <a:p>
+            <a:r>
+              <a:rPr lang="en-US" dirty="0" smtClean="0"/>
+              <a:t>&lt;</a:t>
+            </a:r>
+            <a:r>
+              <a:rPr lang="en-US" dirty="0" err="1" smtClean="0"/>
+              <a:t>Nav</a:t>
+            </a:r>
+            <a:r>
+              <a:rPr lang="en-US" dirty="0" smtClean="0"/>
+              <a:t>&gt;</a:t>
+            </a:r>
+          </a:p>
+          <a:p>
+            <a:r>
+              <a:rPr lang="en-US" dirty="0" smtClean="0"/>
+              <a:t>&lt;Section&gt;</a:t>
+            </a:r>
+            <a:endParaRPr lang="bg-BG" dirty="0" smtClean="0"/>
+          </a:p>
+          <a:p>
+            <a:r>
+              <a:rPr lang="en-US" dirty="0" smtClean="0"/>
+              <a:t>&lt;aside&gt;</a:t>
+            </a:r>
+          </a:p>
+          <a:p>
+            <a:r>
+              <a:rPr lang="en-US" dirty="0" smtClean="0"/>
+              <a:t>&lt;article&gt;</a:t>
+            </a:r>
+          </a:p>
+          <a:p>
+            <a:r>
+              <a:rPr lang="en-US" dirty="0" smtClean="0"/>
+              <a:t>&lt;footer&gt;</a:t>
+            </a:r>
+          </a:p>
+          <a:p>
+            <a:r>
+              <a:rPr lang="bg-BG" dirty="0" err="1" smtClean="0"/>
+              <a:t>Повечве</a:t>
+            </a:r>
+            <a:r>
+              <a:rPr lang="bg-BG" dirty="0" smtClean="0"/>
+              <a:t> относно новите таговете на </a:t>
+            </a:r>
+            <a:r>
+              <a:rPr lang="en-US" dirty="0" smtClean="0"/>
+              <a:t>HTML5</a:t>
+            </a:r>
+            <a:r>
+              <a:rPr lang="bg-BG" dirty="0" smtClean="0"/>
+              <a:t>:</a:t>
+            </a:r>
+          </a:p>
+          <a:p>
+            <a:pPr marL="0" indent="0">
+              <a:buNone/>
+            </a:pPr>
+            <a:r>
+              <a:rPr lang="en-US" dirty="0" smtClean="0">
+                <a:hlinkClick r:id="rId2"/>
+              </a:rPr>
+              <a:t>http</a:t>
+            </a:r>
+            <a:r>
+              <a:rPr lang="en-US" dirty="0">
+                <a:hlinkClick r:id="rId2"/>
+              </a:rPr>
+              <a:t>://</a:t>
+            </a:r>
+            <a:r>
+              <a:rPr lang="en-US" dirty="0" smtClean="0">
+                <a:hlinkClick r:id="rId2"/>
+              </a:rPr>
+              <a:t>www.w3schools.com/html/html5_new_elements.asp</a:t>
+            </a:r>
+            <a:endParaRPr lang="bg-BG" dirty="0" smtClean="0"/>
+          </a:p>
+          <a:p>
+            <a:endParaRPr lang="en-US" dirty="0"/>
+          </a:p>
+        </p:txBody>
+      </p:sp>
+    </p:spTree>
+    <p:extLst>
+      <p:ext uri="{BB962C8B-B14F-4D97-AF65-F5344CB8AC3E}">
+        <p14:creationId xmlns:p14="http://schemas.microsoft.com/office/powerpoint/2010/main" val="282580509"/>
+      </p:ext>
+    </p:extLst>
+  </p:cSld>
+  <p:clrMapOvr>
+    <a:masterClrMapping/>
+  </p:clrMapOvr>
+</p:sld>
+</file>
+
+<file path=ppt/slides/slide17.xml><?xml version="1.0" encoding="utf-8"?>
+<p:sld xmlns:a="http://schemas.openxmlformats.org/drawingml/2006/main" xmlns:r="http://schemas.openxmlformats.org/officeDocument/2006/relationships" xmlns:p="http://schemas.openxmlformats.org/presentationml/2006/main">
+  <p:cSld>
+    <p:spTree>
+      <p:nvGrpSpPr>
+        <p:cNvPr id="1" name=""/>
+        <p:cNvGrpSpPr/>
+        <p:nvPr/>
+      </p:nvGrpSpPr>
+      <p:grpSpPr>
+        <a:xfrm>
+          <a:off x="0" y="0"/>
+          <a:ext cx="0" cy="0"/>
+          <a:chOff x="0" y="0"/>
+          <a:chExt cx="0" cy="0"/>
+        </a:xfrm>
+      </p:grpSpPr>
+      <p:sp>
+        <p:nvSpPr>
+          <p:cNvPr id="2" name="Title 1"/>
+          <p:cNvSpPr>
+            <a:spLocks noGrp="1"/>
+          </p:cNvSpPr>
+          <p:nvPr>
+            <p:ph type="title"/>
+          </p:nvPr>
+        </p:nvSpPr>
         <p:spPr>
           <a:xfrm>
             <a:off x="913775" y="173675"/>
@@ -7026,7 +7220,7 @@
 </p:sld>
 </file>
 
-<file path=ppt/slides/slide16.xml><?xml version="1.0" encoding="utf-8"?>
+<file path=ppt/slides/slide18.xml><?xml version="1.0" encoding="utf-8"?>
 <p:sld xmlns:a="http://schemas.openxmlformats.org/drawingml/2006/main" xmlns:r="http://schemas.openxmlformats.org/officeDocument/2006/relationships" xmlns:p="http://schemas.openxmlformats.org/presentationml/2006/main">
   <p:cSld>
     <p:spTree>

</xml_diff>